<commit_message>
#36 + Anfangsfolie angepasst + Bilddateien erzeugt
</commit_message>
<xml_diff>
--- a/Präsentationen/04-DataVault/DataVault.pptx
+++ b/Präsentationen/04-DataVault/DataVault.pptx
@@ -8,7 +8,7 @@
     <p:notesMasterId r:id="rId13"/>
   </p:notesMasterIdLst>
   <p:sldIdLst>
-    <p:sldId id="256" r:id="rId2"/>
+    <p:sldId id="260" r:id="rId2"/>
     <p:sldId id="274" r:id="rId3"/>
     <p:sldId id="275" r:id="rId4"/>
     <p:sldId id="276" r:id="rId5"/>
@@ -234,7 +234,7 @@
           <a:p>
             <a:fld id="{EF3F0B1F-D673-4C4A-8728-8D2703E6B253}" type="datetimeFigureOut">
               <a:rPr lang="de-DE" smtClean="0"/>
-              <a:t>04.05.22</a:t>
+              <a:t>05.05.2022</a:t>
             </a:fld>
             <a:endParaRPr lang="de-DE"/>
           </a:p>
@@ -392,7 +392,7 @@
           <a:p>
             <a:fld id="{0DAB0C15-1D43-44C0-AE16-C827164FF4B1}" type="slidenum">
               <a:rPr lang="de-DE" smtClean="0"/>
-              <a:t>‹#›</a:t>
+              <a:t>‹Nr.›</a:t>
             </a:fld>
             <a:endParaRPr lang="de-DE"/>
           </a:p>
@@ -660,7 +660,7 @@
           <a:p>
             <a:fld id="{26D6A3BD-1351-47C2-BB80-28B172A8BC67}" type="datetime4">
               <a:rPr lang="en-US" smtClean="0"/>
-              <a:t>May 4, 2022</a:t>
+              <a:t>May 5, 2022</a:t>
             </a:fld>
             <a:endParaRPr lang="en-US"/>
           </a:p>
@@ -714,7 +714,7 @@
           <a:p>
             <a:fld id="{9D4AEF59-F28E-467C-9EA3-92D1CFAD475A}" type="slidenum">
               <a:rPr lang="en-US" smtClean="0"/>
-              <a:t>‹#›</a:t>
+              <a:t>‹Nr.›</a:t>
             </a:fld>
             <a:endParaRPr lang="en-US" dirty="0"/>
           </a:p>
@@ -836,7 +836,7 @@
           <a:p>
             <a:fld id="{E6CB15F1-7933-4E76-9137-72D8C9B28351}" type="datetime4">
               <a:rPr lang="en-US" smtClean="0"/>
-              <a:t>May 4, 2022</a:t>
+              <a:t>May 5, 2022</a:t>
             </a:fld>
             <a:endParaRPr lang="en-US"/>
           </a:p>
@@ -890,7 +890,7 @@
           <a:p>
             <a:fld id="{9D4AEF59-F28E-467C-9EA3-92D1CFAD475A}" type="slidenum">
               <a:rPr lang="en-US" smtClean="0"/>
-              <a:t>‹#›</a:t>
+              <a:t>‹Nr.›</a:t>
             </a:fld>
             <a:endParaRPr lang="en-US"/>
           </a:p>
@@ -1075,7 +1075,7 @@
           <a:p>
             <a:fld id="{62F543C8-886D-41FA-8E25-DE0948C190A0}" type="datetime4">
               <a:rPr lang="en-US" smtClean="0"/>
-              <a:t>May 4, 2022</a:t>
+              <a:t>May 5, 2022</a:t>
             </a:fld>
             <a:endParaRPr lang="en-US"/>
           </a:p>
@@ -1129,7 +1129,7 @@
           <a:p>
             <a:fld id="{9D4AEF59-F28E-467C-9EA3-92D1CFAD475A}" type="slidenum">
               <a:rPr lang="en-US" smtClean="0"/>
-              <a:t>‹#›</a:t>
+              <a:t>‹Nr.›</a:t>
             </a:fld>
             <a:endParaRPr lang="en-US"/>
           </a:p>
@@ -1280,7 +1280,7 @@
           <a:p>
             <a:fld id="{87477AD2-509E-4566-BA8A-4ECB08403BB1}" type="datetime4">
               <a:rPr lang="en-US" smtClean="0"/>
-              <a:t>May 4, 2022</a:t>
+              <a:t>May 5, 2022</a:t>
             </a:fld>
             <a:endParaRPr lang="en-US"/>
           </a:p>
@@ -1344,7 +1344,7 @@
           <a:p>
             <a:fld id="{9D4AEF59-F28E-467C-9EA3-92D1CFAD475A}" type="slidenum">
               <a:rPr lang="en-US" smtClean="0"/>
-              <a:t>‹#›</a:t>
+              <a:t>‹Nr.›</a:t>
             </a:fld>
             <a:endParaRPr lang="en-US" dirty="0"/>
           </a:p>
@@ -1570,7 +1570,7 @@
           <a:p>
             <a:fld id="{1DB299C2-03B0-4C72-B038-356E0B9D1651}" type="datetime4">
               <a:rPr lang="en-US" smtClean="0"/>
-              <a:t>May 4, 2022</a:t>
+              <a:t>May 5, 2022</a:t>
             </a:fld>
             <a:endParaRPr lang="en-US"/>
           </a:p>
@@ -1624,7 +1624,7 @@
           <a:p>
             <a:fld id="{9D4AEF59-F28E-467C-9EA3-92D1CFAD475A}" type="slidenum">
               <a:rPr lang="en-US" smtClean="0"/>
-              <a:t>‹#›</a:t>
+              <a:t>‹Nr.›</a:t>
             </a:fld>
             <a:endParaRPr lang="en-US"/>
           </a:p>
@@ -1860,7 +1860,7 @@
           <a:p>
             <a:fld id="{A2C3C639-3FA5-4EF5-B71F-72FB34E149C5}" type="datetime4">
               <a:rPr lang="en-US" smtClean="0"/>
-              <a:t>May 4, 2022</a:t>
+              <a:t>May 5, 2022</a:t>
             </a:fld>
             <a:endParaRPr lang="en-US" dirty="0"/>
           </a:p>
@@ -1919,7 +1919,7 @@
           <a:p>
             <a:fld id="{9D4AEF59-F28E-467C-9EA3-92D1CFAD475A}" type="slidenum">
               <a:rPr lang="en-US" smtClean="0"/>
-              <a:t>‹#›</a:t>
+              <a:t>‹Nr.›</a:t>
             </a:fld>
             <a:endParaRPr lang="en-US" dirty="0"/>
           </a:p>
@@ -2283,7 +2283,7 @@
           <a:p>
             <a:fld id="{D12C2768-39A0-4FF9-8B80-9C8AB2368080}" type="datetime4">
               <a:rPr lang="en-US" smtClean="0"/>
-              <a:t>May 4, 2022</a:t>
+              <a:t>May 5, 2022</a:t>
             </a:fld>
             <a:endParaRPr lang="en-US"/>
           </a:p>
@@ -2337,7 +2337,7 @@
           <a:p>
             <a:fld id="{9D4AEF59-F28E-467C-9EA3-92D1CFAD475A}" type="slidenum">
               <a:rPr lang="en-US" smtClean="0"/>
-              <a:t>‹#›</a:t>
+              <a:t>‹Nr.›</a:t>
             </a:fld>
             <a:endParaRPr lang="en-US"/>
           </a:p>
@@ -2425,7 +2425,7 @@
           <a:p>
             <a:fld id="{2AC58C00-7B94-441C-8745-12431DCFF69F}" type="datetime4">
               <a:rPr lang="en-US" smtClean="0"/>
-              <a:t>May 4, 2022</a:t>
+              <a:t>May 5, 2022</a:t>
             </a:fld>
             <a:endParaRPr lang="en-US"/>
           </a:p>
@@ -2479,7 +2479,7 @@
           <a:p>
             <a:fld id="{9D4AEF59-F28E-467C-9EA3-92D1CFAD475A}" type="slidenum">
               <a:rPr lang="en-US" smtClean="0"/>
-              <a:t>‹#›</a:t>
+              <a:t>‹Nr.›</a:t>
             </a:fld>
             <a:endParaRPr lang="en-US"/>
           </a:p>
@@ -2567,7 +2567,7 @@
           <a:p>
             <a:fld id="{FF6AF0F0-EBF4-4AD8-B090-33A31C685300}" type="datetime4">
               <a:rPr lang="en-US" smtClean="0"/>
-              <a:t>May 4, 2022</a:t>
+              <a:t>May 5, 2022</a:t>
             </a:fld>
             <a:endParaRPr lang="en-US"/>
           </a:p>
@@ -2626,7 +2626,7 @@
           <a:p>
             <a:fld id="{9D4AEF59-F28E-467C-9EA3-92D1CFAD475A}" type="slidenum">
               <a:rPr lang="en-US" smtClean="0"/>
-              <a:t>‹#›</a:t>
+              <a:t>‹Nr.›</a:t>
             </a:fld>
             <a:endParaRPr lang="en-US"/>
           </a:p>
@@ -2887,7 +2887,7 @@
           <a:p>
             <a:fld id="{2CCCEA74-5CF3-452C-9348-6086333827F5}" type="datetime4">
               <a:rPr lang="en-US" smtClean="0"/>
-              <a:t>May 4, 2022</a:t>
+              <a:t>May 5, 2022</a:t>
             </a:fld>
             <a:endParaRPr lang="en-US"/>
           </a:p>
@@ -2941,7 +2941,7 @@
           <a:p>
             <a:fld id="{9D4AEF59-F28E-467C-9EA3-92D1CFAD475A}" type="slidenum">
               <a:rPr lang="en-US" smtClean="0"/>
-              <a:t>‹#›</a:t>
+              <a:t>‹Nr.›</a:t>
             </a:fld>
             <a:endParaRPr lang="en-US"/>
           </a:p>
@@ -3180,7 +3180,7 @@
           <a:p>
             <a:fld id="{A9849EEA-9318-4930-859F-1ADE410F7D19}" type="datetime4">
               <a:rPr lang="en-US" smtClean="0"/>
-              <a:t>May 4, 2022</a:t>
+              <a:t>May 5, 2022</a:t>
             </a:fld>
             <a:endParaRPr lang="en-US"/>
           </a:p>
@@ -3234,7 +3234,7 @@
           <a:p>
             <a:fld id="{9D4AEF59-F28E-467C-9EA3-92D1CFAD475A}" type="slidenum">
               <a:rPr lang="en-US" smtClean="0"/>
-              <a:t>‹#›</a:t>
+              <a:t>‹Nr.›</a:t>
             </a:fld>
             <a:endParaRPr lang="en-US"/>
           </a:p>
@@ -3461,7 +3461,7 @@
           <a:p>
             <a:fld id="{D77D9FF4-8C7A-432E-977E-F55438F223C5}" type="datetime4">
               <a:rPr lang="en-US" smtClean="0"/>
-              <a:t>May 4, 2022</a:t>
+              <a:t>May 5, 2022</a:t>
             </a:fld>
             <a:endParaRPr lang="en-US" dirty="0">
               <a:latin typeface="+mn-lt"/>
@@ -3560,7 +3560,7 @@
             <a:fld id="{9D4AEF59-F28E-467C-9EA3-92D1CFAD475A}" type="slidenum">
               <a:rPr lang="en-US" smtClean="0"/>
               <a:pPr/>
-              <a:t>‹#›</a:t>
+              <a:t>‹Nr.›</a:t>
             </a:fld>
             <a:endParaRPr lang="en-US" dirty="0">
               <a:latin typeface="+mn-lt"/>
@@ -4018,22 +4018,521 @@
           <a:chExt cx="0" cy="0"/>
         </a:xfrm>
       </p:grpSpPr>
-      <p:sp>
-        <p:nvSpPr>
-          <p:cNvPr id="5" name="Textfeld 4">
-            <a:extLst>
-              <a:ext uri="{FF2B5EF4-FFF2-40B4-BE49-F238E27FC236}">
-                <a16:creationId xmlns:a16="http://schemas.microsoft.com/office/drawing/2014/main" id="{51048280-E235-CA2E-EDB5-C300844C53DC}"/>
-              </a:ext>
-            </a:extLst>
-          </p:cNvPr>
-          <p:cNvSpPr txBox="1"/>
+      <p:pic>
+        <p:nvPicPr>
+          <p:cNvPr id="34" name="Picture 3" descr="Personen, die an Ideen arbeiten">
+            <a:extLst>
+              <a:ext uri="{FF2B5EF4-FFF2-40B4-BE49-F238E27FC236}">
+                <a16:creationId xmlns:a16="http://schemas.microsoft.com/office/drawing/2014/main" id="{7B6B69A5-A372-4FF2-0435-7C422CC1F0E0}"/>
+              </a:ext>
+            </a:extLst>
+          </p:cNvPr>
+          <p:cNvPicPr>
+            <a:picLocks noChangeAspect="1"/>
+          </p:cNvPicPr>
           <p:nvPr/>
-        </p:nvSpPr>
+        </p:nvPicPr>
+        <p:blipFill rotWithShape="1">
+          <a:blip r:embed="rId2"/>
+          <a:srcRect l="24454" r="32063" b="-1"/>
+          <a:stretch/>
+        </p:blipFill>
         <p:spPr>
           <a:xfrm>
-            <a:off x="250370" y="2048327"/>
-            <a:ext cx="7736114" cy="2215991"/>
+            <a:off x="7616215" y="10886"/>
+            <a:ext cx="4575785" cy="6858000"/>
+          </a:xfrm>
+          <a:custGeom>
+            <a:avLst/>
+            <a:gdLst/>
+            <a:ahLst/>
+            <a:cxnLst/>
+            <a:rect l="l" t="t" r="r" b="b"/>
+            <a:pathLst>
+              <a:path w="4575785" h="6857999">
+                <a:moveTo>
+                  <a:pt x="517468" y="0"/>
+                </a:moveTo>
+                <a:lnTo>
+                  <a:pt x="4575785" y="0"/>
+                </a:lnTo>
+                <a:lnTo>
+                  <a:pt x="4575785" y="6857999"/>
+                </a:lnTo>
+                <a:lnTo>
+                  <a:pt x="960511" y="6857999"/>
+                </a:lnTo>
+                <a:lnTo>
+                  <a:pt x="942694" y="6843617"/>
+                </a:lnTo>
+                <a:cubicBezTo>
+                  <a:pt x="964945" y="6792705"/>
+                  <a:pt x="892574" y="6836929"/>
+                  <a:pt x="865960" y="6827318"/>
+                </a:cubicBezTo>
+                <a:lnTo>
+                  <a:pt x="861487" y="6823037"/>
+                </a:lnTo>
+                <a:lnTo>
+                  <a:pt x="859513" y="6806858"/>
+                </a:lnTo>
+                <a:lnTo>
+                  <a:pt x="860461" y="6800037"/>
+                </a:lnTo>
+                <a:cubicBezTo>
+                  <a:pt x="860484" y="6795612"/>
+                  <a:pt x="859691" y="6793024"/>
+                  <a:pt x="858251" y="6791626"/>
+                </a:cubicBezTo>
+                <a:lnTo>
+                  <a:pt x="857660" y="6791654"/>
+                </a:lnTo>
+                <a:lnTo>
+                  <a:pt x="856643" y="6783314"/>
+                </a:lnTo>
+                <a:cubicBezTo>
+                  <a:pt x="856157" y="6768705"/>
+                  <a:pt x="856848" y="6753980"/>
+                  <a:pt x="858459" y="6739543"/>
+                </a:cubicBezTo>
+                <a:cubicBezTo>
+                  <a:pt x="825704" y="6742272"/>
+                  <a:pt x="849542" y="6681110"/>
+                  <a:pt x="794118" y="6710916"/>
+                </a:cubicBezTo>
+                <a:cubicBezTo>
+                  <a:pt x="794610" y="6692179"/>
+                  <a:pt x="815573" y="6671806"/>
+                  <a:pt x="779817" y="6693690"/>
+                </a:cubicBezTo>
+                <a:cubicBezTo>
+                  <a:pt x="778915" y="6687990"/>
+                  <a:pt x="774885" y="6685995"/>
+                  <a:pt x="769310" y="6685745"/>
+                </a:cubicBezTo>
+                <a:lnTo>
+                  <a:pt x="766802" y="6686064"/>
+                </a:lnTo>
+                <a:cubicBezTo>
+                  <a:pt x="767473" y="6672038"/>
+                  <a:pt x="768145" y="6658011"/>
+                  <a:pt x="768816" y="6643985"/>
+                </a:cubicBezTo>
+                <a:lnTo>
+                  <a:pt x="764758" y="6640288"/>
+                </a:lnTo>
+                <a:lnTo>
+                  <a:pt x="771603" y="6610439"/>
+                </a:lnTo>
+                <a:cubicBezTo>
+                  <a:pt x="771799" y="6605729"/>
+                  <a:pt x="776328" y="6505678"/>
+                  <a:pt x="776524" y="6500968"/>
+                </a:cubicBezTo>
+                <a:lnTo>
+                  <a:pt x="716862" y="6252242"/>
+                </a:lnTo>
+                <a:cubicBezTo>
+                  <a:pt x="710358" y="6209033"/>
+                  <a:pt x="712158" y="6177416"/>
+                  <a:pt x="706006" y="6116988"/>
+                </a:cubicBezTo>
+                <a:cubicBezTo>
+                  <a:pt x="664744" y="6009788"/>
+                  <a:pt x="669134" y="5997889"/>
+                  <a:pt x="675681" y="5921438"/>
+                </a:cubicBezTo>
+                <a:cubicBezTo>
+                  <a:pt x="609567" y="5910253"/>
+                  <a:pt x="667197" y="5880778"/>
+                  <a:pt x="646967" y="5848021"/>
+                </a:cubicBezTo>
+                <a:cubicBezTo>
+                  <a:pt x="633539" y="5819166"/>
+                  <a:pt x="610193" y="5775630"/>
+                  <a:pt x="595120" y="5722308"/>
+                </a:cubicBezTo>
+                <a:cubicBezTo>
+                  <a:pt x="587517" y="5685814"/>
+                  <a:pt x="566330" y="5564010"/>
+                  <a:pt x="556522" y="5528087"/>
+                </a:cubicBezTo>
+                <a:cubicBezTo>
+                  <a:pt x="551310" y="5519174"/>
+                  <a:pt x="556171" y="5505252"/>
+                  <a:pt x="536270" y="5506770"/>
+                </a:cubicBezTo>
+                <a:cubicBezTo>
+                  <a:pt x="512052" y="5506489"/>
+                  <a:pt x="543356" y="5459435"/>
+                  <a:pt x="516612" y="5473320"/>
+                </a:cubicBezTo>
+                <a:cubicBezTo>
+                  <a:pt x="537947" y="5440196"/>
+                  <a:pt x="486731" y="5435838"/>
+                  <a:pt x="471989" y="5418523"/>
+                </a:cubicBezTo>
+                <a:cubicBezTo>
+                  <a:pt x="493820" y="5390817"/>
+                  <a:pt x="454363" y="5377479"/>
+                  <a:pt x="442299" y="5333204"/>
+                </a:cubicBezTo>
+                <a:cubicBezTo>
+                  <a:pt x="467689" y="5302287"/>
+                  <a:pt x="420786" y="5307848"/>
+                  <a:pt x="452960" y="5255192"/>
+                </a:cubicBezTo>
+                <a:cubicBezTo>
+                  <a:pt x="453300" y="5233631"/>
+                  <a:pt x="429983" y="5195187"/>
+                  <a:pt x="431339" y="5156169"/>
+                </a:cubicBezTo>
+                <a:cubicBezTo>
+                  <a:pt x="398945" y="5067566"/>
+                  <a:pt x="403718" y="5079988"/>
+                  <a:pt x="404757" y="5025421"/>
+                </a:cubicBezTo>
+                <a:cubicBezTo>
+                  <a:pt x="400018" y="4966103"/>
+                  <a:pt x="402758" y="4976631"/>
+                  <a:pt x="395660" y="4924394"/>
+                </a:cubicBezTo>
+                <a:cubicBezTo>
+                  <a:pt x="383838" y="4897752"/>
+                  <a:pt x="406451" y="4876973"/>
+                  <a:pt x="390158" y="4861232"/>
+                </a:cubicBezTo>
+                <a:cubicBezTo>
+                  <a:pt x="362582" y="4877952"/>
+                  <a:pt x="368360" y="4813711"/>
+                  <a:pt x="341238" y="4838615"/>
+                </a:cubicBezTo>
+                <a:cubicBezTo>
+                  <a:pt x="311503" y="4831441"/>
+                  <a:pt x="352577" y="4804970"/>
+                  <a:pt x="326273" y="4796524"/>
+                </a:cubicBezTo>
+                <a:lnTo>
+                  <a:pt x="284996" y="4672372"/>
+                </a:lnTo>
+                <a:cubicBezTo>
+                  <a:pt x="298118" y="4649489"/>
+                  <a:pt x="287003" y="4640074"/>
+                  <a:pt x="267970" y="4634255"/>
+                </a:cubicBezTo>
+                <a:cubicBezTo>
+                  <a:pt x="263754" y="4595383"/>
+                  <a:pt x="222766" y="4593405"/>
+                  <a:pt x="203275" y="4555830"/>
+                </a:cubicBezTo>
+                <a:cubicBezTo>
+                  <a:pt x="181514" y="4524570"/>
+                  <a:pt x="154438" y="4520149"/>
+                  <a:pt x="133797" y="4479914"/>
+                </a:cubicBezTo>
+                <a:cubicBezTo>
+                  <a:pt x="124082" y="4457346"/>
+                  <a:pt x="105185" y="4427564"/>
+                  <a:pt x="84156" y="4415916"/>
+                </a:cubicBezTo>
+                <a:lnTo>
+                  <a:pt x="83303" y="4414752"/>
+                </a:lnTo>
+                <a:lnTo>
+                  <a:pt x="72062" y="4388525"/>
+                </a:lnTo>
+                <a:lnTo>
+                  <a:pt x="75315" y="4375182"/>
+                </a:lnTo>
+                <a:cubicBezTo>
+                  <a:pt x="75941" y="4370194"/>
+                  <a:pt x="75530" y="4367154"/>
+                  <a:pt x="74333" y="4365355"/>
+                </a:cubicBezTo>
+                <a:lnTo>
+                  <a:pt x="68893" y="4364787"/>
+                </a:lnTo>
+                <a:cubicBezTo>
+                  <a:pt x="68887" y="4364737"/>
+                  <a:pt x="68881" y="4364686"/>
+                  <a:pt x="68875" y="4364636"/>
+                </a:cubicBezTo>
+                <a:cubicBezTo>
+                  <a:pt x="68620" y="4351507"/>
+                  <a:pt x="69309" y="4337030"/>
+                  <a:pt x="58168" y="4323582"/>
+                </a:cubicBezTo>
+                <a:cubicBezTo>
+                  <a:pt x="61811" y="4263350"/>
+                  <a:pt x="99263" y="4233013"/>
+                  <a:pt x="79972" y="4208494"/>
+                </a:cubicBezTo>
+                <a:cubicBezTo>
+                  <a:pt x="88758" y="4180446"/>
+                  <a:pt x="125844" y="4152085"/>
+                  <a:pt x="106280" y="4120638"/>
+                </a:cubicBezTo>
+                <a:cubicBezTo>
+                  <a:pt x="111598" y="4121936"/>
+                  <a:pt x="113804" y="4120147"/>
+                  <a:pt x="114398" y="4116558"/>
+                </a:cubicBezTo>
+                <a:cubicBezTo>
+                  <a:pt x="114157" y="4114248"/>
+                  <a:pt x="113917" y="4111937"/>
+                  <a:pt x="113677" y="4109627"/>
+                </a:cubicBezTo>
+                <a:lnTo>
+                  <a:pt x="105699" y="4105626"/>
+                </a:lnTo>
+                <a:cubicBezTo>
+                  <a:pt x="77890" y="4088880"/>
+                  <a:pt x="108987" y="4082598"/>
+                  <a:pt x="106408" y="4051443"/>
+                </a:cubicBezTo>
+                <a:cubicBezTo>
+                  <a:pt x="106858" y="4036630"/>
+                  <a:pt x="97032" y="3985550"/>
+                  <a:pt x="103822" y="3988496"/>
+                </a:cubicBezTo>
+                <a:lnTo>
+                  <a:pt x="75372" y="3857059"/>
+                </a:lnTo>
+                <a:cubicBezTo>
+                  <a:pt x="82817" y="3836376"/>
+                  <a:pt x="81742" y="3824520"/>
+                  <a:pt x="64937" y="3815652"/>
+                </a:cubicBezTo>
+                <a:cubicBezTo>
+                  <a:pt x="102287" y="3718925"/>
+                  <a:pt x="55573" y="3772320"/>
+                  <a:pt x="59080" y="3696747"/>
+                </a:cubicBezTo>
+                <a:cubicBezTo>
+                  <a:pt x="66269" y="3629648"/>
+                  <a:pt x="63240" y="3571908"/>
+                  <a:pt x="85623" y="3491441"/>
+                </a:cubicBezTo>
+                <a:cubicBezTo>
+                  <a:pt x="98410" y="3474059"/>
+                  <a:pt x="99525" y="3431012"/>
+                  <a:pt x="100691" y="3417526"/>
+                </a:cubicBezTo>
+                <a:cubicBezTo>
+                  <a:pt x="101857" y="3404040"/>
+                  <a:pt x="95556" y="3412369"/>
+                  <a:pt x="92620" y="3410525"/>
+                </a:cubicBezTo>
+                <a:cubicBezTo>
+                  <a:pt x="92153" y="3374230"/>
+                  <a:pt x="83244" y="3285268"/>
+                  <a:pt x="79737" y="3235496"/>
+                </a:cubicBezTo>
+                <a:cubicBezTo>
+                  <a:pt x="70953" y="3207448"/>
+                  <a:pt x="52012" y="3143347"/>
+                  <a:pt x="71576" y="3111898"/>
+                </a:cubicBezTo>
+                <a:cubicBezTo>
+                  <a:pt x="66408" y="3077014"/>
+                  <a:pt x="53542" y="3056489"/>
+                  <a:pt x="48725" y="3026189"/>
+                </a:cubicBezTo>
+                <a:cubicBezTo>
+                  <a:pt x="35029" y="3013335"/>
+                  <a:pt x="35295" y="2950066"/>
+                  <a:pt x="42673" y="2930099"/>
+                </a:cubicBezTo>
+                <a:cubicBezTo>
+                  <a:pt x="72765" y="2876461"/>
+                  <a:pt x="20837" y="2811743"/>
+                  <a:pt x="43260" y="2768401"/>
+                </a:cubicBezTo>
+                <a:cubicBezTo>
+                  <a:pt x="44784" y="2755816"/>
+                  <a:pt x="43709" y="2744724"/>
+                  <a:pt x="41022" y="2734617"/>
+                </a:cubicBezTo>
+                <a:lnTo>
+                  <a:pt x="29707" y="2708118"/>
+                </a:lnTo>
+                <a:lnTo>
+                  <a:pt x="18896" y="2704187"/>
+                </a:lnTo>
+                <a:lnTo>
+                  <a:pt x="16157" y="2686013"/>
+                </a:lnTo>
+                <a:lnTo>
+                  <a:pt x="0" y="2656506"/>
+                </a:lnTo>
+                <a:cubicBezTo>
+                  <a:pt x="46275" y="2648213"/>
+                  <a:pt x="-21852" y="2580542"/>
+                  <a:pt x="20000" y="2589495"/>
+                </a:cubicBezTo>
+                <a:cubicBezTo>
+                  <a:pt x="9004" y="2539865"/>
+                  <a:pt x="51725" y="2561406"/>
+                  <a:pt x="4503" y="2517909"/>
+                </a:cubicBezTo>
+                <a:cubicBezTo>
+                  <a:pt x="18312" y="2426183"/>
+                  <a:pt x="2043" y="2320005"/>
+                  <a:pt x="38580" y="2235940"/>
+                </a:cubicBezTo>
+                <a:cubicBezTo>
+                  <a:pt x="39530" y="2131535"/>
+                  <a:pt x="31342" y="1983035"/>
+                  <a:pt x="28357" y="1891475"/>
+                </a:cubicBezTo>
+                <a:cubicBezTo>
+                  <a:pt x="18536" y="1816240"/>
+                  <a:pt x="53985" y="1820215"/>
+                  <a:pt x="16422" y="1754299"/>
+                </a:cubicBezTo>
+                <a:cubicBezTo>
+                  <a:pt x="22523" y="1748800"/>
+                  <a:pt x="14115" y="1712020"/>
+                  <a:pt x="17619" y="1704948"/>
+                </a:cubicBezTo>
+                <a:lnTo>
+                  <a:pt x="11875" y="1640075"/>
+                </a:lnTo>
+                <a:lnTo>
+                  <a:pt x="10148" y="1637400"/>
+                </a:lnTo>
+                <a:cubicBezTo>
+                  <a:pt x="6571" y="1625366"/>
+                  <a:pt x="7662" y="1617809"/>
+                  <a:pt x="10809" y="1612250"/>
+                </a:cubicBezTo>
+                <a:lnTo>
+                  <a:pt x="30710" y="1498099"/>
+                </a:lnTo>
+                <a:lnTo>
+                  <a:pt x="28832" y="1497366"/>
+                </a:lnTo>
+                <a:lnTo>
+                  <a:pt x="25420" y="1490044"/>
+                </a:lnTo>
+                <a:lnTo>
+                  <a:pt x="36357" y="1429750"/>
+                </a:lnTo>
+                <a:cubicBezTo>
+                  <a:pt x="56105" y="1395764"/>
+                  <a:pt x="51096" y="1348657"/>
+                  <a:pt x="63323" y="1316453"/>
+                </a:cubicBezTo>
+                <a:cubicBezTo>
+                  <a:pt x="113953" y="1206017"/>
+                  <a:pt x="97314" y="1160971"/>
+                  <a:pt x="167299" y="1100758"/>
+                </a:cubicBezTo>
+                <a:cubicBezTo>
+                  <a:pt x="183322" y="1066821"/>
+                  <a:pt x="207320" y="1013057"/>
+                  <a:pt x="218971" y="997428"/>
+                </a:cubicBezTo>
+                <a:cubicBezTo>
+                  <a:pt x="225661" y="983599"/>
+                  <a:pt x="245059" y="996998"/>
+                  <a:pt x="249304" y="969068"/>
+                </a:cubicBezTo>
+                <a:cubicBezTo>
+                  <a:pt x="273910" y="912445"/>
+                  <a:pt x="257335" y="876944"/>
+                  <a:pt x="307518" y="815816"/>
+                </a:cubicBezTo>
+                <a:cubicBezTo>
+                  <a:pt x="319844" y="734499"/>
+                  <a:pt x="427269" y="648257"/>
+                  <a:pt x="438631" y="588216"/>
+                </a:cubicBezTo>
+                <a:cubicBezTo>
+                  <a:pt x="468336" y="534577"/>
+                  <a:pt x="480025" y="521047"/>
+                  <a:pt x="494548" y="466832"/>
+                </a:cubicBezTo>
+                <a:cubicBezTo>
+                  <a:pt x="513994" y="444023"/>
+                  <a:pt x="469014" y="421695"/>
+                  <a:pt x="512985" y="406165"/>
+                </a:cubicBezTo>
+                <a:cubicBezTo>
+                  <a:pt x="519819" y="312467"/>
+                  <a:pt x="496295" y="285415"/>
+                  <a:pt x="499246" y="226337"/>
+                </a:cubicBezTo>
+                <a:cubicBezTo>
+                  <a:pt x="511217" y="180655"/>
+                  <a:pt x="525793" y="85726"/>
+                  <a:pt x="530694" y="51692"/>
+                </a:cubicBezTo>
+                <a:cubicBezTo>
+                  <a:pt x="512001" y="39736"/>
+                  <a:pt x="522977" y="34428"/>
+                  <a:pt x="528655" y="22135"/>
+                </a:cubicBezTo>
+                <a:cubicBezTo>
+                  <a:pt x="511506" y="14446"/>
+                  <a:pt x="513258" y="7722"/>
+                  <a:pt x="516964" y="1039"/>
+                </a:cubicBezTo>
+                <a:close/>
+              </a:path>
+            </a:pathLst>
+          </a:custGeom>
+        </p:spPr>
+      </p:pic>
+      <p:sp>
+        <p:nvSpPr>
+          <p:cNvPr id="3" name="Foliennummernplatzhalter 2">
+            <a:extLst>
+              <a:ext uri="{FF2B5EF4-FFF2-40B4-BE49-F238E27FC236}">
+                <a16:creationId xmlns:a16="http://schemas.microsoft.com/office/drawing/2014/main" id="{632C2AA6-737B-5A45-5369-5FCA90710BFE}"/>
+              </a:ext>
+            </a:extLst>
+          </p:cNvPr>
+          <p:cNvSpPr>
+            <a:spLocks noGrp="1"/>
+          </p:cNvSpPr>
+          <p:nvPr>
+            <p:ph type="sldNum" sz="quarter" idx="12"/>
+          </p:nvPr>
+        </p:nvSpPr>
+        <p:spPr/>
+        <p:txBody>
+          <a:bodyPr/>
+          <a:lstStyle/>
+          <a:p>
+            <a:fld id="{9D4AEF59-F28E-467C-9EA3-92D1CFAD475A}" type="slidenum">
+              <a:rPr lang="en-US" smtClean="0"/>
+              <a:t>1</a:t>
+            </a:fld>
+            <a:endParaRPr lang="en-US"/>
+          </a:p>
+        </p:txBody>
+      </p:sp>
+      <p:sp>
+        <p:nvSpPr>
+          <p:cNvPr id="11" name="Titel 10">
+            <a:extLst>
+              <a:ext uri="{FF2B5EF4-FFF2-40B4-BE49-F238E27FC236}">
+                <a16:creationId xmlns:a16="http://schemas.microsoft.com/office/drawing/2014/main" id="{17F22C30-2D44-65DE-384C-06E243A6996A}"/>
+              </a:ext>
+            </a:extLst>
+          </p:cNvPr>
+          <p:cNvSpPr txBox="1">
+            <a:spLocks noGrp="1"/>
+          </p:cNvSpPr>
+          <p:nvPr>
+            <p:ph type="title"/>
+          </p:nvPr>
+        </p:nvSpPr>
+        <p:spPr>
+          <a:xfrm>
+            <a:off x="288924" y="2817871"/>
+            <a:ext cx="7112137" cy="1222258"/>
           </a:xfrm>
           <a:prstGeom prst="rect">
             <a:avLst/>
@@ -4047,7 +4546,7 @@
           <a:lstStyle/>
           <a:p>
             <a:r>
-              <a:rPr lang="de-DE" sz="6000" dirty="0" err="1">
+              <a:rPr lang="de-DE" sz="4800" dirty="0" err="1">
                 <a:solidFill>
                   <a:schemeClr val="tx1">
                     <a:lumMod val="85000"/>
@@ -4057,7 +4556,7 @@
               </a:rPr>
               <a:t>DataVault</a:t>
             </a:r>
-            <a:endParaRPr lang="de-DE" sz="6000" dirty="0">
+            <a:endParaRPr lang="de-DE" sz="4800" dirty="0">
               <a:solidFill>
                 <a:schemeClr val="tx1">
                   <a:lumMod val="85000"/>
@@ -4067,7 +4566,18 @@
             </a:endParaRPr>
           </a:p>
           <a:p>
-            <a:endParaRPr lang="de-DE" sz="3200" dirty="0">
+            <a:r>
+              <a:rPr lang="de-DE" sz="1800" dirty="0">
+                <a:solidFill>
+                  <a:schemeClr val="tx1">
+                    <a:lumMod val="85000"/>
+                    <a:lumOff val="15000"/>
+                  </a:schemeClr>
+                </a:solidFill>
+              </a:rPr>
+              <a:t>Data Engineering Bootcamp</a:t>
+            </a:r>
+            <a:endParaRPr lang="en-US" sz="1800" dirty="0">
               <a:solidFill>
                 <a:schemeClr val="tx1">
                   <a:lumMod val="85000"/>
@@ -4076,292 +4586,12 @@
               </a:solidFill>
             </a:endParaRPr>
           </a:p>
-          <a:p>
-            <a:r>
-              <a:rPr lang="de-DE" sz="3000" dirty="0">
-                <a:solidFill>
-                  <a:schemeClr val="tx1">
-                    <a:lumMod val="85000"/>
-                    <a:lumOff val="15000"/>
-                  </a:schemeClr>
-                </a:solidFill>
-              </a:rPr>
-              <a:t>Data Engineering Bootcamp</a:t>
-            </a:r>
-            <a:endParaRPr lang="en-US" sz="3000" dirty="0">
-              <a:solidFill>
-                <a:schemeClr val="tx1">
-                  <a:lumMod val="85000"/>
-                  <a:lumOff val="15000"/>
-                </a:schemeClr>
-              </a:solidFill>
-            </a:endParaRPr>
-          </a:p>
-          <a:p>
-            <a:r>
-              <a:rPr lang="en-US" sz="1600" dirty="0">
-                <a:solidFill>
-                  <a:schemeClr val="tx1">
-                    <a:lumMod val="85000"/>
-                    <a:lumOff val="15000"/>
-                  </a:schemeClr>
-                </a:solidFill>
-              </a:rPr>
-              <a:t>Data management and archiving in the research environment</a:t>
-            </a:r>
-            <a:endParaRPr lang="de-DE" sz="1600" dirty="0">
-              <a:solidFill>
-                <a:schemeClr val="tx1">
-                  <a:lumMod val="85000"/>
-                  <a:lumOff val="15000"/>
-                </a:schemeClr>
-              </a:solidFill>
-            </a:endParaRPr>
-          </a:p>
-        </p:txBody>
-      </p:sp>
-      <p:sp>
-        <p:nvSpPr>
-          <p:cNvPr id="18" name="Untertitel 2">
-            <a:extLst>
-              <a:ext uri="{FF2B5EF4-FFF2-40B4-BE49-F238E27FC236}">
-                <a16:creationId xmlns:a16="http://schemas.microsoft.com/office/drawing/2014/main" id="{A09A5460-6BFE-FF91-7668-C28F6FB0AE84}"/>
-              </a:ext>
-            </a:extLst>
-          </p:cNvPr>
-          <p:cNvSpPr txBox="1">
-            <a:spLocks/>
-          </p:cNvSpPr>
-          <p:nvPr/>
-        </p:nvSpPr>
-        <p:spPr>
-          <a:xfrm>
-            <a:off x="250370" y="6287148"/>
-            <a:ext cx="8354858" cy="984251"/>
-          </a:xfrm>
-          <a:prstGeom prst="rect">
-            <a:avLst/>
-          </a:prstGeom>
-        </p:spPr>
-        <p:txBody>
-          <a:bodyPr vert="horz" lIns="91440" tIns="45720" rIns="91440" bIns="45720" rtlCol="0" anchor="t">
-            <a:normAutofit/>
-          </a:bodyPr>
-          <a:lstStyle>
-            <a:lvl1pPr marL="0" indent="0" algn="ctr" defTabSz="914400" rtl="0" eaLnBrk="1" latinLnBrk="0" hangingPunct="1">
-              <a:lnSpc>
-                <a:spcPct val="100000"/>
-              </a:lnSpc>
-              <a:spcBef>
-                <a:spcPts val="1000"/>
-              </a:spcBef>
-              <a:buSzPct val="80000"/>
-              <a:buFont typeface="Arial" panose="020B0604020202020204" pitchFamily="34" charset="0"/>
-              <a:buNone/>
-              <a:defRPr sz="2000" i="0" kern="1200" spc="160" baseline="0">
-                <a:solidFill>
-                  <a:schemeClr val="tx1">
-                    <a:lumMod val="85000"/>
-                    <a:lumOff val="15000"/>
-                  </a:schemeClr>
-                </a:solidFill>
-                <a:latin typeface="+mn-lt"/>
-                <a:ea typeface="Batang" panose="02030600000101010101" pitchFamily="18" charset="-127"/>
-                <a:cs typeface="+mn-cs"/>
-              </a:defRPr>
-            </a:lvl1pPr>
-            <a:lvl2pPr marL="457200" indent="0" algn="ctr" defTabSz="914400" rtl="0" eaLnBrk="1" latinLnBrk="0" hangingPunct="1">
-              <a:lnSpc>
-                <a:spcPct val="100000"/>
-              </a:lnSpc>
-              <a:spcBef>
-                <a:spcPts val="500"/>
-              </a:spcBef>
-              <a:buFontTx/>
-              <a:buNone/>
-              <a:defRPr sz="2000" kern="1200" spc="50" baseline="0">
-                <a:solidFill>
-                  <a:schemeClr val="tx1">
-                    <a:lumMod val="85000"/>
-                    <a:lumOff val="15000"/>
-                  </a:schemeClr>
-                </a:solidFill>
-                <a:latin typeface="+mn-lt"/>
-                <a:ea typeface="Batang" panose="02030600000101010101" pitchFamily="18" charset="-127"/>
-                <a:cs typeface="+mn-cs"/>
-              </a:defRPr>
-            </a:lvl2pPr>
-            <a:lvl3pPr marL="914400" indent="0" algn="ctr" defTabSz="914400" rtl="0" eaLnBrk="1" latinLnBrk="0" hangingPunct="1">
-              <a:lnSpc>
-                <a:spcPct val="100000"/>
-              </a:lnSpc>
-              <a:spcBef>
-                <a:spcPts val="500"/>
-              </a:spcBef>
-              <a:buSzPct val="80000"/>
-              <a:buFont typeface="Arial" panose="020B0604020202020204" pitchFamily="34" charset="0"/>
-              <a:buNone/>
-              <a:defRPr sz="1800" kern="1200" spc="50" baseline="0">
-                <a:solidFill>
-                  <a:schemeClr val="tx1">
-                    <a:lumMod val="85000"/>
-                    <a:lumOff val="15000"/>
-                  </a:schemeClr>
-                </a:solidFill>
-                <a:latin typeface="+mn-lt"/>
-                <a:ea typeface="Batang" panose="02030600000101010101" pitchFamily="18" charset="-127"/>
-                <a:cs typeface="+mn-cs"/>
-              </a:defRPr>
-            </a:lvl3pPr>
-            <a:lvl4pPr marL="1371600" indent="0" algn="ctr" defTabSz="914400" rtl="0" eaLnBrk="1" latinLnBrk="0" hangingPunct="1">
-              <a:lnSpc>
-                <a:spcPct val="100000"/>
-              </a:lnSpc>
-              <a:spcBef>
-                <a:spcPts val="500"/>
-              </a:spcBef>
-              <a:buFontTx/>
-              <a:buNone/>
-              <a:defRPr sz="1600" kern="1200" spc="50" baseline="0">
-                <a:solidFill>
-                  <a:schemeClr val="tx1">
-                    <a:lumMod val="85000"/>
-                    <a:lumOff val="15000"/>
-                  </a:schemeClr>
-                </a:solidFill>
-                <a:latin typeface="+mn-lt"/>
-                <a:ea typeface="Batang" panose="02030600000101010101" pitchFamily="18" charset="-127"/>
-                <a:cs typeface="+mn-cs"/>
-              </a:defRPr>
-            </a:lvl4pPr>
-            <a:lvl5pPr marL="1828800" indent="0" algn="ctr" defTabSz="914400" rtl="0" eaLnBrk="1" latinLnBrk="0" hangingPunct="1">
-              <a:lnSpc>
-                <a:spcPct val="100000"/>
-              </a:lnSpc>
-              <a:spcBef>
-                <a:spcPts val="500"/>
-              </a:spcBef>
-              <a:buSzPct val="80000"/>
-              <a:buFont typeface="Arial" panose="020B0604020202020204" pitchFamily="34" charset="0"/>
-              <a:buNone/>
-              <a:defRPr sz="1600" kern="1200" spc="50" baseline="0">
-                <a:solidFill>
-                  <a:schemeClr val="tx1">
-                    <a:lumMod val="85000"/>
-                    <a:lumOff val="15000"/>
-                  </a:schemeClr>
-                </a:solidFill>
-                <a:latin typeface="+mn-lt"/>
-                <a:ea typeface="Batang" panose="02030600000101010101" pitchFamily="18" charset="-127"/>
-                <a:cs typeface="+mn-cs"/>
-              </a:defRPr>
-            </a:lvl5pPr>
-            <a:lvl6pPr marL="2286000" indent="0" algn="ctr" defTabSz="914400" rtl="0" eaLnBrk="1" latinLnBrk="0" hangingPunct="1">
-              <a:lnSpc>
-                <a:spcPct val="90000"/>
-              </a:lnSpc>
-              <a:spcBef>
-                <a:spcPts val="500"/>
-              </a:spcBef>
-              <a:buFont typeface="Arial" panose="020B0604020202020204" pitchFamily="34" charset="0"/>
-              <a:buNone/>
-              <a:defRPr sz="1600" kern="1200">
-                <a:solidFill>
-                  <a:schemeClr val="tx1"/>
-                </a:solidFill>
-                <a:latin typeface="+mn-lt"/>
-                <a:ea typeface="+mn-ea"/>
-                <a:cs typeface="+mn-cs"/>
-              </a:defRPr>
-            </a:lvl6pPr>
-            <a:lvl7pPr marL="2743200" indent="0" algn="ctr" defTabSz="914400" rtl="0" eaLnBrk="1" latinLnBrk="0" hangingPunct="1">
-              <a:lnSpc>
-                <a:spcPct val="90000"/>
-              </a:lnSpc>
-              <a:spcBef>
-                <a:spcPts val="500"/>
-              </a:spcBef>
-              <a:buFont typeface="Arial" panose="020B0604020202020204" pitchFamily="34" charset="0"/>
-              <a:buNone/>
-              <a:defRPr sz="1600" kern="1200">
-                <a:solidFill>
-                  <a:schemeClr val="tx1"/>
-                </a:solidFill>
-                <a:latin typeface="+mn-lt"/>
-                <a:ea typeface="+mn-ea"/>
-                <a:cs typeface="+mn-cs"/>
-              </a:defRPr>
-            </a:lvl7pPr>
-            <a:lvl8pPr marL="3200400" indent="0" algn="ctr" defTabSz="914400" rtl="0" eaLnBrk="1" latinLnBrk="0" hangingPunct="1">
-              <a:lnSpc>
-                <a:spcPct val="90000"/>
-              </a:lnSpc>
-              <a:spcBef>
-                <a:spcPts val="500"/>
-              </a:spcBef>
-              <a:buFont typeface="Arial" panose="020B0604020202020204" pitchFamily="34" charset="0"/>
-              <a:buNone/>
-              <a:defRPr sz="1600" kern="1200">
-                <a:solidFill>
-                  <a:schemeClr val="tx1"/>
-                </a:solidFill>
-                <a:latin typeface="+mn-lt"/>
-                <a:ea typeface="+mn-ea"/>
-                <a:cs typeface="+mn-cs"/>
-              </a:defRPr>
-            </a:lvl8pPr>
-            <a:lvl9pPr marL="3657600" indent="0" algn="ctr" defTabSz="914400" rtl="0" eaLnBrk="1" latinLnBrk="0" hangingPunct="1">
-              <a:lnSpc>
-                <a:spcPct val="90000"/>
-              </a:lnSpc>
-              <a:spcBef>
-                <a:spcPts val="500"/>
-              </a:spcBef>
-              <a:buFont typeface="Arial" panose="020B0604020202020204" pitchFamily="34" charset="0"/>
-              <a:buNone/>
-              <a:defRPr sz="1600" kern="1200">
-                <a:solidFill>
-                  <a:schemeClr val="tx1"/>
-                </a:solidFill>
-                <a:latin typeface="+mn-lt"/>
-                <a:ea typeface="+mn-ea"/>
-                <a:cs typeface="+mn-cs"/>
-              </a:defRPr>
-            </a:lvl9pPr>
-          </a:lstStyle>
-          <a:p>
-            <a:pPr algn="l"/>
-            <a:r>
-              <a:rPr lang="de-DE" sz="1800" dirty="0"/>
-              <a:t>By Niklas Büchner, Christian Singer, Ahmad Al-</a:t>
-            </a:r>
-            <a:r>
-              <a:rPr lang="de-DE" sz="1800" dirty="0" err="1"/>
-              <a:t>Taie</a:t>
-            </a:r>
-            <a:r>
-              <a:rPr lang="de-DE" sz="1800" dirty="0"/>
-              <a:t>, Mike Sickmüller</a:t>
-            </a:r>
-          </a:p>
-          <a:p>
-            <a:pPr algn="l"/>
-            <a:endParaRPr lang="de-DE" sz="1800" dirty="0"/>
-          </a:p>
-          <a:p>
-            <a:pPr algn="l"/>
-            <a:endParaRPr lang="de-DE" dirty="0"/>
-          </a:p>
-          <a:p>
-            <a:pPr algn="l"/>
-            <a:endParaRPr lang="de-DE" dirty="0"/>
-          </a:p>
         </p:txBody>
       </p:sp>
     </p:spTree>
     <p:extLst>
       <p:ext uri="{BB962C8B-B14F-4D97-AF65-F5344CB8AC3E}">
-        <p14:creationId xmlns:p14="http://schemas.microsoft.com/office/powerpoint/2010/main" val="2941810262"/>
+        <p14:creationId xmlns:p14="http://schemas.microsoft.com/office/powerpoint/2010/main" val="2271149996"/>
       </p:ext>
     </p:extLst>
   </p:cSld>

</xml_diff>